<commit_message>
Deployment Flask done + Final Report
</commit_message>
<xml_diff>
--- a/Week13/Final Report.pptx
+++ b/Week13/Final Report.pptx
@@ -6780,12 +6780,59 @@
           </a:prstGeom>
         </p:spPr>
       </p:pic>
+      <p:sp>
+        <p:nvSpPr>
+          <p:cNvPr id="10" name="TextBox 9">
+            <a:extLst>
+              <a:ext uri="{FF2B5EF4-FFF2-40B4-BE49-F238E27FC236}">
+                <a16:creationId xmlns:a16="http://schemas.microsoft.com/office/drawing/2014/main" id="{52E3CB9E-83EB-FEB5-019E-2156C3058C54}"/>
+              </a:ext>
+            </a:extLst>
+          </p:cNvPr>
+          <p:cNvSpPr txBox="1"/>
+          <p:nvPr/>
+        </p:nvSpPr>
+        <p:spPr>
+          <a:xfrm>
+            <a:off x="681789" y="5638800"/>
+            <a:ext cx="10627895" cy="584775"/>
+          </a:xfrm>
+          <a:prstGeom prst="rect">
+            <a:avLst/>
+          </a:prstGeom>
+          <a:noFill/>
+        </p:spPr>
+        <p:txBody>
+          <a:bodyPr wrap="square" rtlCol="0">
+            <a:spAutoFit/>
+          </a:bodyPr>
+          <a:lstStyle/>
+          <a:p>
+            <a:pPr algn="ctr"/>
+            <a:r>
+              <a:rPr lang="en-US" sz="1600" dirty="0">
+                <a:latin typeface="+mj-lt"/>
+              </a:rPr>
+              <a:t>The attachment screenshots for code of flask deployment and the last screenshot was when predict the value of     </a:t>
+            </a:r>
+          </a:p>
+          <a:p>
+            <a:pPr algn="ctr"/>
+            <a:r>
+              <a:rPr lang="en-US" sz="1600" dirty="0">
+                <a:latin typeface="+mj-lt"/>
+              </a:rPr>
+              <a:t>persistently _Flag </a:t>
+            </a:r>
+          </a:p>
+        </p:txBody>
+      </p:sp>
       <p:pic>
         <p:nvPicPr>
-          <p:cNvPr id="9" name="Picture 8">
-            <a:extLst>
-              <a:ext uri="{FF2B5EF4-FFF2-40B4-BE49-F238E27FC236}">
-                <a16:creationId xmlns:a16="http://schemas.microsoft.com/office/drawing/2014/main" id="{28872E16-B2A8-DEF8-B797-6A36E0426AC9}"/>
+          <p:cNvPr id="7" name="Picture 6">
+            <a:extLst>
+              <a:ext uri="{FF2B5EF4-FFF2-40B4-BE49-F238E27FC236}">
+                <a16:creationId xmlns:a16="http://schemas.microsoft.com/office/drawing/2014/main" id="{FB8CACD6-120A-0E96-6709-6E25F53CAE96}"/>
               </a:ext>
             </a:extLst>
           </p:cNvPr>
@@ -6802,52 +6849,44 @@
         </p:blipFill>
         <p:spPr>
           <a:xfrm>
-            <a:off x="7058767" y="2562961"/>
-            <a:ext cx="4892551" cy="2373805"/>
+            <a:off x="404925" y="4809693"/>
+            <a:ext cx="6213308" cy="829107"/>
           </a:xfrm>
           <a:prstGeom prst="rect">
             <a:avLst/>
           </a:prstGeom>
         </p:spPr>
       </p:pic>
-      <p:sp>
-        <p:nvSpPr>
-          <p:cNvPr id="10" name="TextBox 9">
-            <a:extLst>
-              <a:ext uri="{FF2B5EF4-FFF2-40B4-BE49-F238E27FC236}">
-                <a16:creationId xmlns:a16="http://schemas.microsoft.com/office/drawing/2014/main" id="{52E3CB9E-83EB-FEB5-019E-2156C3058C54}"/>
-              </a:ext>
-            </a:extLst>
-          </p:cNvPr>
-          <p:cNvSpPr txBox="1"/>
+      <p:pic>
+        <p:nvPicPr>
+          <p:cNvPr id="11" name="Picture 10">
+            <a:extLst>
+              <a:ext uri="{FF2B5EF4-FFF2-40B4-BE49-F238E27FC236}">
+                <a16:creationId xmlns:a16="http://schemas.microsoft.com/office/drawing/2014/main" id="{2F3A5DE1-9725-257B-0F72-327F9C746423}"/>
+              </a:ext>
+            </a:extLst>
+          </p:cNvPr>
+          <p:cNvPicPr>
+            <a:picLocks noChangeAspect="1"/>
+          </p:cNvPicPr>
           <p:nvPr/>
-        </p:nvSpPr>
-        <p:spPr>
-          <a:xfrm>
-            <a:off x="681789" y="5638800"/>
-            <a:ext cx="10627895" cy="338554"/>
+        </p:nvPicPr>
+        <p:blipFill>
+          <a:blip r:embed="rId5"/>
+          <a:stretch>
+            <a:fillRect/>
+          </a:stretch>
+        </p:blipFill>
+        <p:spPr>
+          <a:xfrm>
+            <a:off x="7166297" y="2212264"/>
+            <a:ext cx="4873303" cy="2620655"/>
           </a:xfrm>
           <a:prstGeom prst="rect">
             <a:avLst/>
           </a:prstGeom>
-          <a:noFill/>
-        </p:spPr>
-        <p:txBody>
-          <a:bodyPr wrap="square" rtlCol="0">
-            <a:spAutoFit/>
-          </a:bodyPr>
-          <a:lstStyle/>
-          <a:p>
-            <a:pPr algn="ctr"/>
-            <a:r>
-              <a:rPr lang="en-US" sz="1600" dirty="0">
-                <a:latin typeface="+mj-lt"/>
-              </a:rPr>
-              <a:t>The attachment screenshots for code of flask deployment</a:t>
-            </a:r>
-          </a:p>
-        </p:txBody>
-      </p:sp>
+        </p:spPr>
+      </p:pic>
     </p:spTree>
     <p:extLst>
       <p:ext uri="{BB962C8B-B14F-4D97-AF65-F5344CB8AC3E}">

</xml_diff>